<commit_message>
updates to fig scripts
</commit_message>
<xml_diff>
--- a/figures/fig3-hb.pptx
+++ b/figures/fig3-hb.pptx
@@ -3326,41 +3326,6 @@
           <a:chExt cx="0" cy="0"/>
         </a:xfrm>
       </p:grpSpPr>
-      <p:sp>
-        <p:nvSpPr>
-          <p:cNvPr id="8" name="TextBox 7">
-            <a:extLst>
-              <a:ext uri="{FF2B5EF4-FFF2-40B4-BE49-F238E27FC236}">
-                <a16:creationId xmlns:a16="http://schemas.microsoft.com/office/drawing/2014/main" id="{0C63D7CE-D9D9-13FF-1EAD-7BDDF254538F}"/>
-              </a:ext>
-            </a:extLst>
-          </p:cNvPr>
-          <p:cNvSpPr txBox="1"/>
-          <p:nvPr/>
-        </p:nvSpPr>
-        <p:spPr>
-          <a:xfrm rot="5400000">
-            <a:off x="11530361" y="6727195"/>
-            <a:ext cx="381836" cy="261610"/>
-          </a:xfrm>
-          <a:prstGeom prst="rect">
-            <a:avLst/>
-          </a:prstGeom>
-          <a:noFill/>
-        </p:spPr>
-        <p:txBody>
-          <a:bodyPr wrap="none" rtlCol="0">
-            <a:spAutoFit/>
-          </a:bodyPr>
-          <a:lstStyle/>
-          <a:p>
-            <a:r>
-              <a:rPr lang="en-US" sz="1050" dirty="0"/>
-              <a:t>P-A</a:t>
-            </a:r>
-          </a:p>
-        </p:txBody>
-      </p:sp>
       <p:pic>
         <p:nvPicPr>
           <p:cNvPr id="7" name="Picture 6">

</xml_diff>